<commit_message>
slide updates for 2015-06-19
</commit_message>
<xml_diff>
--- a/slides/BOSH Hands-on Training.pptx
+++ b/slides/BOSH Hands-on Training.pptx
@@ -25,9 +25,6 @@
     <p:sldId id="270" r:id="rId20"/>
     <p:sldId id="271" r:id="rId21"/>
     <p:sldId id="272" r:id="rId22"/>
-    <p:sldId id="273" r:id="rId23"/>
-    <p:sldId id="274" r:id="rId24"/>
-    <p:sldId id="275" r:id="rId25"/>
   </p:sldIdLst>
   <p:sldSz cy="5143500" cx="9144000"/>
   <p:notesSz cx="6858000" cy="9144000"/>
@@ -1352,216 +1349,6 @@
 </p:notes>
 </file>
 
-<file path=ppt/notesSlides/notesSlide18.xml><?xml version="1.0" encoding="utf-8"?>
-<p:notes xmlns:a="http://schemas.openxmlformats.org/drawingml/2006/main" xmlns:r="http://schemas.openxmlformats.org/officeDocument/2006/relationships" xmlns:mc="http://schemas.openxmlformats.org/markup-compatibility/2006" xmlns:mv="urn:schemas-microsoft-com:mac:vml" xmlns:p="http://schemas.openxmlformats.org/presentationml/2006/main" xmlns:c="http://schemas.openxmlformats.org/drawingml/2006/chart" xmlns:dgm="http://schemas.openxmlformats.org/drawingml/2006/diagram" xmlns:o="urn:schemas-microsoft-com:office:office" xmlns:v="urn:schemas-microsoft-com:vml" xmlns:pvml="urn:schemas-microsoft-com:office:powerpoint" xmlns:com="http://schemas.openxmlformats.org/drawingml/2006/compatibility" xmlns:p14="http://schemas.microsoft.com/office/powerpoint/2010/main" showMasterPhAnim="0" showMasterSp="0">
-  <p:cSld>
-    <p:spTree>
-      <p:nvGrpSpPr>
-        <p:cNvPr id="179" name="Shape 179"/>
-        <p:cNvGrpSpPr/>
-        <p:nvPr/>
-      </p:nvGrpSpPr>
-      <p:grpSpPr>
-        <a:xfrm>
-          <a:off x="0" y="0"/>
-          <a:ext cx="0" cy="0"/>
-          <a:chOff x="0" y="0"/>
-          <a:chExt cx="0" cy="0"/>
-        </a:xfrm>
-      </p:grpSpPr>
-      <p:sp>
-        <p:nvSpPr>
-          <p:cNvPr id="180" name="Shape 180"/>
-          <p:cNvSpPr/>
-          <p:nvPr>
-            <p:ph idx="2" type="sldImg"/>
-          </p:nvPr>
-        </p:nvSpPr>
-        <p:spPr>
-          <a:xfrm>
-            <a:off x="381187" y="685800"/>
-            <a:ext cx="6096299" cy="3429000"/>
-          </a:xfrm>
-          <a:custGeom>
-            <a:pathLst>
-              <a:path extrusionOk="0" h="120000" w="120000">
-                <a:moveTo>
-                  <a:pt x="0" y="0"/>
-                </a:moveTo>
-                <a:lnTo>
-                  <a:pt x="120000" y="0"/>
-                </a:lnTo>
-                <a:lnTo>
-                  <a:pt x="120000" y="120000"/>
-                </a:lnTo>
-                <a:lnTo>
-                  <a:pt x="0" y="120000"/>
-                </a:lnTo>
-                <a:close/>
-              </a:path>
-            </a:pathLst>
-          </a:custGeom>
-          <a:noFill/>
-          <a:ln cap="flat" cmpd="sng" w="9525">
-            <a:solidFill>
-              <a:srgbClr val="000000"/>
-            </a:solidFill>
-            <a:prstDash val="solid"/>
-            <a:round/>
-            <a:headEnd len="med" w="med" type="none"/>
-            <a:tailEnd len="med" w="med" type="none"/>
-          </a:ln>
-        </p:spPr>
-      </p:sp>
-      <p:sp>
-        <p:nvSpPr>
-          <p:cNvPr id="181" name="Shape 181"/>
-          <p:cNvSpPr txBox="1"/>
-          <p:nvPr>
-            <p:ph idx="1" type="body"/>
-          </p:nvPr>
-        </p:nvSpPr>
-        <p:spPr>
-          <a:xfrm>
-            <a:off x="685800" y="4343400"/>
-            <a:ext cx="5486399" cy="4114800"/>
-          </a:xfrm>
-          <a:prstGeom prst="rect">
-            <a:avLst/>
-          </a:prstGeom>
-        </p:spPr>
-        <p:txBody>
-          <a:bodyPr anchorCtr="0" anchor="t" bIns="91425" lIns="91425" rIns="91425" tIns="91425">
-            <a:noAutofit/>
-          </a:bodyPr>
-          <a:lstStyle/>
-          <a:p>
-            <a:pPr>
-              <a:spcBef>
-                <a:spcPts val="0"/>
-              </a:spcBef>
-              <a:buNone/>
-            </a:pPr>
-            <a:r>
-              <a:t/>
-            </a:r>
-            <a:endParaRPr/>
-          </a:p>
-        </p:txBody>
-      </p:sp>
-    </p:spTree>
-  </p:cSld>
-  <p:clrMapOvr>
-    <a:masterClrMapping/>
-  </p:clrMapOvr>
-</p:notes>
-</file>
-
-<file path=ppt/notesSlides/notesSlide19.xml><?xml version="1.0" encoding="utf-8"?>
-<p:notes xmlns:a="http://schemas.openxmlformats.org/drawingml/2006/main" xmlns:r="http://schemas.openxmlformats.org/officeDocument/2006/relationships" xmlns:mc="http://schemas.openxmlformats.org/markup-compatibility/2006" xmlns:mv="urn:schemas-microsoft-com:mac:vml" xmlns:p="http://schemas.openxmlformats.org/presentationml/2006/main" xmlns:c="http://schemas.openxmlformats.org/drawingml/2006/chart" xmlns:dgm="http://schemas.openxmlformats.org/drawingml/2006/diagram" xmlns:o="urn:schemas-microsoft-com:office:office" xmlns:v="urn:schemas-microsoft-com:vml" xmlns:pvml="urn:schemas-microsoft-com:office:powerpoint" xmlns:com="http://schemas.openxmlformats.org/drawingml/2006/compatibility" xmlns:p14="http://schemas.microsoft.com/office/powerpoint/2010/main" showMasterPhAnim="0" showMasterSp="0">
-  <p:cSld>
-    <p:spTree>
-      <p:nvGrpSpPr>
-        <p:cNvPr id="185" name="Shape 185"/>
-        <p:cNvGrpSpPr/>
-        <p:nvPr/>
-      </p:nvGrpSpPr>
-      <p:grpSpPr>
-        <a:xfrm>
-          <a:off x="0" y="0"/>
-          <a:ext cx="0" cy="0"/>
-          <a:chOff x="0" y="0"/>
-          <a:chExt cx="0" cy="0"/>
-        </a:xfrm>
-      </p:grpSpPr>
-      <p:sp>
-        <p:nvSpPr>
-          <p:cNvPr id="186" name="Shape 186"/>
-          <p:cNvSpPr/>
-          <p:nvPr>
-            <p:ph idx="2" type="sldImg"/>
-          </p:nvPr>
-        </p:nvSpPr>
-        <p:spPr>
-          <a:xfrm>
-            <a:off x="381187" y="685800"/>
-            <a:ext cx="6096299" cy="3429000"/>
-          </a:xfrm>
-          <a:custGeom>
-            <a:pathLst>
-              <a:path extrusionOk="0" h="120000" w="120000">
-                <a:moveTo>
-                  <a:pt x="0" y="0"/>
-                </a:moveTo>
-                <a:lnTo>
-                  <a:pt x="120000" y="0"/>
-                </a:lnTo>
-                <a:lnTo>
-                  <a:pt x="120000" y="120000"/>
-                </a:lnTo>
-                <a:lnTo>
-                  <a:pt x="0" y="120000"/>
-                </a:lnTo>
-                <a:close/>
-              </a:path>
-            </a:pathLst>
-          </a:custGeom>
-          <a:noFill/>
-          <a:ln cap="flat" cmpd="sng" w="9525">
-            <a:solidFill>
-              <a:srgbClr val="000000"/>
-            </a:solidFill>
-            <a:prstDash val="solid"/>
-            <a:round/>
-            <a:headEnd len="med" w="med" type="none"/>
-            <a:tailEnd len="med" w="med" type="none"/>
-          </a:ln>
-        </p:spPr>
-      </p:sp>
-      <p:sp>
-        <p:nvSpPr>
-          <p:cNvPr id="187" name="Shape 187"/>
-          <p:cNvSpPr txBox="1"/>
-          <p:nvPr>
-            <p:ph idx="1" type="body"/>
-          </p:nvPr>
-        </p:nvSpPr>
-        <p:spPr>
-          <a:xfrm>
-            <a:off x="685800" y="4343400"/>
-            <a:ext cx="5486399" cy="4114800"/>
-          </a:xfrm>
-          <a:prstGeom prst="rect">
-            <a:avLst/>
-          </a:prstGeom>
-        </p:spPr>
-        <p:txBody>
-          <a:bodyPr anchorCtr="0" anchor="t" bIns="91425" lIns="91425" rIns="91425" tIns="91425">
-            <a:noAutofit/>
-          </a:bodyPr>
-          <a:lstStyle/>
-          <a:p>
-            <a:pPr>
-              <a:spcBef>
-                <a:spcPts val="0"/>
-              </a:spcBef>
-              <a:buNone/>
-            </a:pPr>
-            <a:r>
-              <a:t/>
-            </a:r>
-            <a:endParaRPr/>
-          </a:p>
-        </p:txBody>
-      </p:sp>
-    </p:spTree>
-  </p:cSld>
-  <p:clrMapOvr>
-    <a:masterClrMapping/>
-  </p:clrMapOvr>
-</p:notes>
-</file>
-
 <file path=ppt/notesSlides/notesSlide2.xml><?xml version="1.0" encoding="utf-8"?>
 <p:notes xmlns:a="http://schemas.openxmlformats.org/drawingml/2006/main" xmlns:r="http://schemas.openxmlformats.org/officeDocument/2006/relationships" xmlns:mc="http://schemas.openxmlformats.org/markup-compatibility/2006" xmlns:mv="urn:schemas-microsoft-com:mac:vml" xmlns:p="http://schemas.openxmlformats.org/presentationml/2006/main" xmlns:c="http://schemas.openxmlformats.org/drawingml/2006/chart" xmlns:dgm="http://schemas.openxmlformats.org/drawingml/2006/diagram" xmlns:o="urn:schemas-microsoft-com:office:office" xmlns:v="urn:schemas-microsoft-com:vml" xmlns:pvml="urn:schemas-microsoft-com:office:powerpoint" xmlns:com="http://schemas.openxmlformats.org/drawingml/2006/compatibility" xmlns:p14="http://schemas.microsoft.com/office/powerpoint/2010/main" showMasterPhAnim="0" showMasterSp="0">
   <p:cSld>
@@ -1626,111 +1413,6 @@
       <p:sp>
         <p:nvSpPr>
           <p:cNvPr id="85" name="Shape 85"/>
-          <p:cNvSpPr txBox="1"/>
-          <p:nvPr>
-            <p:ph idx="1" type="body"/>
-          </p:nvPr>
-        </p:nvSpPr>
-        <p:spPr>
-          <a:xfrm>
-            <a:off x="685800" y="4343400"/>
-            <a:ext cx="5486399" cy="4114800"/>
-          </a:xfrm>
-          <a:prstGeom prst="rect">
-            <a:avLst/>
-          </a:prstGeom>
-        </p:spPr>
-        <p:txBody>
-          <a:bodyPr anchorCtr="0" anchor="t" bIns="91425" lIns="91425" rIns="91425" tIns="91425">
-            <a:noAutofit/>
-          </a:bodyPr>
-          <a:lstStyle/>
-          <a:p>
-            <a:pPr>
-              <a:spcBef>
-                <a:spcPts val="0"/>
-              </a:spcBef>
-              <a:buNone/>
-            </a:pPr>
-            <a:r>
-              <a:t/>
-            </a:r>
-            <a:endParaRPr/>
-          </a:p>
-        </p:txBody>
-      </p:sp>
-    </p:spTree>
-  </p:cSld>
-  <p:clrMapOvr>
-    <a:masterClrMapping/>
-  </p:clrMapOvr>
-</p:notes>
-</file>
-
-<file path=ppt/notesSlides/notesSlide20.xml><?xml version="1.0" encoding="utf-8"?>
-<p:notes xmlns:a="http://schemas.openxmlformats.org/drawingml/2006/main" xmlns:r="http://schemas.openxmlformats.org/officeDocument/2006/relationships" xmlns:mc="http://schemas.openxmlformats.org/markup-compatibility/2006" xmlns:mv="urn:schemas-microsoft-com:mac:vml" xmlns:p="http://schemas.openxmlformats.org/presentationml/2006/main" xmlns:c="http://schemas.openxmlformats.org/drawingml/2006/chart" xmlns:dgm="http://schemas.openxmlformats.org/drawingml/2006/diagram" xmlns:o="urn:schemas-microsoft-com:office:office" xmlns:v="urn:schemas-microsoft-com:vml" xmlns:pvml="urn:schemas-microsoft-com:office:powerpoint" xmlns:com="http://schemas.openxmlformats.org/drawingml/2006/compatibility" xmlns:p14="http://schemas.microsoft.com/office/powerpoint/2010/main" showMasterPhAnim="0" showMasterSp="0">
-  <p:cSld>
-    <p:spTree>
-      <p:nvGrpSpPr>
-        <p:cNvPr id="191" name="Shape 191"/>
-        <p:cNvGrpSpPr/>
-        <p:nvPr/>
-      </p:nvGrpSpPr>
-      <p:grpSpPr>
-        <a:xfrm>
-          <a:off x="0" y="0"/>
-          <a:ext cx="0" cy="0"/>
-          <a:chOff x="0" y="0"/>
-          <a:chExt cx="0" cy="0"/>
-        </a:xfrm>
-      </p:grpSpPr>
-      <p:sp>
-        <p:nvSpPr>
-          <p:cNvPr id="192" name="Shape 192"/>
-          <p:cNvSpPr/>
-          <p:nvPr>
-            <p:ph idx="2" type="sldImg"/>
-          </p:nvPr>
-        </p:nvSpPr>
-        <p:spPr>
-          <a:xfrm>
-            <a:off x="381187" y="685800"/>
-            <a:ext cx="6096299" cy="3429000"/>
-          </a:xfrm>
-          <a:custGeom>
-            <a:pathLst>
-              <a:path extrusionOk="0" h="120000" w="120000">
-                <a:moveTo>
-                  <a:pt x="0" y="0"/>
-                </a:moveTo>
-                <a:lnTo>
-                  <a:pt x="120000" y="0"/>
-                </a:lnTo>
-                <a:lnTo>
-                  <a:pt x="120000" y="120000"/>
-                </a:lnTo>
-                <a:lnTo>
-                  <a:pt x="0" y="120000"/>
-                </a:lnTo>
-                <a:close/>
-              </a:path>
-            </a:pathLst>
-          </a:custGeom>
-          <a:noFill/>
-          <a:ln cap="flat" cmpd="sng" w="9525">
-            <a:solidFill>
-              <a:srgbClr val="000000"/>
-            </a:solidFill>
-            <a:prstDash val="solid"/>
-            <a:round/>
-            <a:headEnd len="med" w="med" type="none"/>
-            <a:tailEnd len="med" w="med" type="none"/>
-          </a:ln>
-        </p:spPr>
-      </p:sp>
-      <p:sp>
-        <p:nvSpPr>
-          <p:cNvPr id="193" name="Shape 193"/>
           <p:cNvSpPr txBox="1"/>
           <p:nvPr>
             <p:ph idx="1" type="body"/>
@@ -7651,7 +7333,7 @@
             </a:pPr>
             <a:r>
               <a:rPr lang="en"/>
-              <a:t>Please check in and log into your VM by 6:40</a:t>
+              <a:t>Please check in and log into your VM within 15 min</a:t>
             </a:r>
           </a:p>
         </p:txBody>
@@ -7931,7 +7613,7 @@
               <a:buChar char="●"/>
             </a:pPr>
             <a:r>
-              <a:rPr lang="en">
+              <a:rPr i="1" lang="en">
                 <a:latin typeface="Consolas"/>
                 <a:ea typeface="Consolas"/>
                 <a:cs typeface="Consolas"/>
@@ -7981,7 +7663,7 @@
                 <a:cs typeface="Consolas"/>
                 <a:sym typeface="Consolas"/>
               </a:rPr>
-              <a:t>SET a passwd (try ‘</a:t>
+              <a:t>SET a passwd (use ‘</a:t>
             </a:r>
             <a:r>
               <a:rPr i="1" lang="en">
@@ -8021,7 +7703,7 @@
                 <a:cs typeface="Consolas"/>
                 <a:sym typeface="Consolas"/>
               </a:rPr>
-              <a:t>enter return at the ssh passphrase prompt</a:t>
+              <a:t>Press “return” at the ssh passphrase prompt</a:t>
             </a:r>
           </a:p>
           <a:p>
@@ -8037,7 +7719,7 @@
               <a:buChar char="●"/>
             </a:pPr>
             <a:r>
-              <a:rPr lang="en">
+              <a:rPr i="1" lang="en">
                 <a:latin typeface="Consolas"/>
                 <a:ea typeface="Consolas"/>
                 <a:cs typeface="Consolas"/>
@@ -8215,6 +7897,28 @@
                 <a:cs typeface="Consolas"/>
                 <a:sym typeface="Consolas"/>
               </a:rPr>
+              <a:t>REBOOT!</a:t>
+            </a:r>
+          </a:p>
+          <a:p>
+            <a:pPr indent="-419100" lvl="0" marL="457200" rtl="0">
+              <a:spcBef>
+                <a:spcPts val="0"/>
+              </a:spcBef>
+              <a:buClr>
+                <a:schemeClr val="lt2"/>
+              </a:buClr>
+              <a:buSzPct val="100000"/>
+              <a:buFont typeface="Arial"/>
+              <a:buChar char="●"/>
+            </a:pPr>
+            <a:r>
+              <a:rPr lang="en">
+                <a:latin typeface="Consolas"/>
+                <a:ea typeface="Consolas"/>
+                <a:cs typeface="Consolas"/>
+                <a:sym typeface="Consolas"/>
+              </a:rPr>
               <a:t>Check your ‘uptime’ to make sure it’s really rebooted</a:t>
             </a:r>
           </a:p>
@@ -8385,13 +8089,22 @@
               <a:buChar char="●"/>
             </a:pPr>
             <a:r>
+              <a:rPr i="1" lang="en">
+                <a:latin typeface="Consolas"/>
+                <a:ea typeface="Consolas"/>
+                <a:cs typeface="Consolas"/>
+                <a:sym typeface="Consolas"/>
+              </a:rPr>
+              <a:t>bosh cck</a:t>
+            </a:r>
+            <a:r>
               <a:rPr lang="en">
                 <a:latin typeface="Consolas"/>
                 <a:ea typeface="Consolas"/>
                 <a:cs typeface="Consolas"/>
                 <a:sym typeface="Consolas"/>
               </a:rPr>
-              <a:t>bosh cck </a:t>
+              <a:t> </a:t>
             </a:r>
           </a:p>
           <a:p>
@@ -8407,57 +8120,66 @@
               <a:buChar char="●"/>
             </a:pPr>
             <a:r>
+              <a:rPr i="1" lang="en">
+                <a:latin typeface="Consolas"/>
+                <a:ea typeface="Consolas"/>
+                <a:cs typeface="Consolas"/>
+                <a:sym typeface="Consolas"/>
+              </a:rPr>
+              <a:t>ls ~/workspace/dummy/meetup/</a:t>
+            </a:r>
+          </a:p>
+          <a:p>
+            <a:pPr indent="-419100" lvl="0" marL="457200" rtl="0">
+              <a:spcBef>
+                <a:spcPts val="0"/>
+              </a:spcBef>
+              <a:buClr>
+                <a:schemeClr val="lt2"/>
+              </a:buClr>
+              <a:buSzPct val="100000"/>
+              <a:buFont typeface="Arial"/>
+              <a:buChar char="●"/>
+            </a:pPr>
+            <a:r>
+              <a:rPr i="1" lang="en">
+                <a:latin typeface="Consolas"/>
+                <a:ea typeface="Consolas"/>
+                <a:cs typeface="Consolas"/>
+                <a:sym typeface="Consolas"/>
+              </a:rPr>
+              <a:t>bosh deployment ~/workspace/dummy/meetup/dep*yml</a:t>
+            </a:r>
+          </a:p>
+          <a:p>
+            <a:pPr indent="-419100" lvl="0" marL="457200" rtl="0">
+              <a:spcBef>
+                <a:spcPts val="0"/>
+              </a:spcBef>
+              <a:buClr>
+                <a:schemeClr val="lt2"/>
+              </a:buClr>
+              <a:buSzPct val="100000"/>
+              <a:buFont typeface="Arial"/>
+              <a:buChar char="●"/>
+            </a:pPr>
+            <a:r>
+              <a:rPr i="1" lang="en">
+                <a:latin typeface="Consolas"/>
+                <a:ea typeface="Consolas"/>
+                <a:cs typeface="Consolas"/>
+                <a:sym typeface="Consolas"/>
+              </a:rPr>
+              <a:t>bosh cck --auto</a:t>
+            </a:r>
+            <a:r>
               <a:rPr lang="en">
                 <a:latin typeface="Consolas"/>
                 <a:ea typeface="Consolas"/>
                 <a:cs typeface="Consolas"/>
                 <a:sym typeface="Consolas"/>
               </a:rPr>
-              <a:t>ls ~/workspace/dummy/meetup/</a:t>
-            </a:r>
-          </a:p>
-          <a:p>
-            <a:pPr indent="-419100" lvl="0" marL="457200" rtl="0">
-              <a:spcBef>
-                <a:spcPts val="0"/>
-              </a:spcBef>
-              <a:buClr>
-                <a:schemeClr val="lt2"/>
-              </a:buClr>
-              <a:buSzPct val="100000"/>
-              <a:buFont typeface="Arial"/>
-              <a:buChar char="●"/>
-            </a:pPr>
-            <a:r>
-              <a:rPr lang="en">
-                <a:latin typeface="Consolas"/>
-                <a:ea typeface="Consolas"/>
-                <a:cs typeface="Consolas"/>
-                <a:sym typeface="Consolas"/>
-              </a:rPr>
-              <a:t>bosh deployment /workspace/dummy/meetup/dep*yml</a:t>
-            </a:r>
-          </a:p>
-          <a:p>
-            <a:pPr indent="-419100" lvl="0" marL="457200" rtl="0">
-              <a:spcBef>
-                <a:spcPts val="0"/>
-              </a:spcBef>
-              <a:buClr>
-                <a:schemeClr val="lt2"/>
-              </a:buClr>
-              <a:buSzPct val="100000"/>
-              <a:buFont typeface="Arial"/>
-              <a:buChar char="●"/>
-            </a:pPr>
-            <a:r>
-              <a:rPr lang="en">
-                <a:latin typeface="Consolas"/>
-                <a:ea typeface="Consolas"/>
-                <a:cs typeface="Consolas"/>
-                <a:sym typeface="Consolas"/>
-              </a:rPr>
-              <a:t>bosh cck </a:t>
+              <a:t> </a:t>
             </a:r>
           </a:p>
         </p:txBody>
@@ -8561,13 +8283,22 @@
               <a:buChar char="●"/>
             </a:pPr>
             <a:r>
+              <a:rPr i="1" lang="en">
+                <a:latin typeface="Consolas"/>
+                <a:ea typeface="Consolas"/>
+                <a:cs typeface="Consolas"/>
+                <a:sym typeface="Consolas"/>
+              </a:rPr>
+              <a:t>bosh deployments</a:t>
+            </a:r>
+            <a:r>
               <a:rPr lang="en">
                 <a:latin typeface="Consolas"/>
                 <a:ea typeface="Consolas"/>
                 <a:cs typeface="Consolas"/>
                 <a:sym typeface="Consolas"/>
               </a:rPr>
-              <a:t>bosh deployments </a:t>
+              <a:t> </a:t>
             </a:r>
           </a:p>
           <a:p>
@@ -8583,7 +8314,7 @@
               <a:buChar char="●"/>
             </a:pPr>
             <a:r>
-              <a:rPr lang="en">
+              <a:rPr i="1" lang="en">
                 <a:latin typeface="Consolas"/>
                 <a:ea typeface="Consolas"/>
                 <a:cs typeface="Consolas"/>
@@ -8715,13 +8446,13 @@
               <a:buChar char="●"/>
             </a:pPr>
             <a:r>
-              <a:rPr lang="en">
+              <a:rPr i="1" lang="en">
                 <a:latin typeface="Consolas"/>
                 <a:ea typeface="Consolas"/>
                 <a:cs typeface="Consolas"/>
                 <a:sym typeface="Consolas"/>
               </a:rPr>
-              <a:t>sudo rm -rf /var/vcap</a:t>
+              <a:t>sudo rm -rf /var/vcap/jobs/*</a:t>
             </a:r>
           </a:p>
           <a:p>
@@ -8737,7 +8468,7 @@
               <a:buChar char="●"/>
             </a:pPr>
             <a:r>
-              <a:rPr lang="en">
+              <a:rPr i="1" lang="en">
                 <a:latin typeface="Consolas"/>
                 <a:ea typeface="Consolas"/>
                 <a:cs typeface="Consolas"/>
@@ -8759,13 +8490,13 @@
               <a:buChar char="●"/>
             </a:pPr>
             <a:r>
-              <a:rPr lang="en">
+              <a:rPr i="1" lang="en">
                 <a:latin typeface="Consolas"/>
                 <a:ea typeface="Consolas"/>
                 <a:cs typeface="Consolas"/>
                 <a:sym typeface="Consolas"/>
               </a:rPr>
-              <a:t>bosh vms</a:t>
+              <a:t>bosh vms --details</a:t>
             </a:r>
           </a:p>
           <a:p>
@@ -8781,13 +8512,13 @@
               <a:buChar char="●"/>
             </a:pPr>
             <a:r>
-              <a:rPr lang="en">
+              <a:rPr i="1" lang="en">
                 <a:latin typeface="Consolas"/>
                 <a:ea typeface="Consolas"/>
                 <a:cs typeface="Consolas"/>
                 <a:sym typeface="Consolas"/>
               </a:rPr>
-              <a:t>bosh recreate &lt;job&gt; &lt;id&gt;</a:t>
+              <a:t>bosh recreate &lt;job&gt; &lt;index&gt;</a:t>
             </a:r>
           </a:p>
           <a:p>
@@ -8803,13 +8534,13 @@
               <a:buChar char="●"/>
             </a:pPr>
             <a:r>
-              <a:rPr lang="en">
+              <a:rPr i="1" lang="en">
                 <a:latin typeface="Consolas"/>
                 <a:ea typeface="Consolas"/>
                 <a:cs typeface="Consolas"/>
                 <a:sym typeface="Consolas"/>
               </a:rPr>
-              <a:t>bosh vms</a:t>
+              <a:t>bosh vms --details</a:t>
             </a:r>
           </a:p>
         </p:txBody>
@@ -8919,7 +8650,55 @@
                 <a:cs typeface="Consolas"/>
                 <a:sym typeface="Consolas"/>
               </a:rPr>
-              <a:t>Add the community repos </a:t>
+              <a:t>The community repos</a:t>
+            </a:r>
+          </a:p>
+          <a:p>
+            <a:pPr indent="-381000" lvl="1" marL="914400" rtl="0">
+              <a:spcBef>
+                <a:spcPts val="0"/>
+              </a:spcBef>
+              <a:buClr>
+                <a:schemeClr val="lt2"/>
+              </a:buClr>
+              <a:buSzPct val="80000"/>
+              <a:buFont typeface="Courier New"/>
+              <a:buChar char="o"/>
+            </a:pPr>
+            <a:r>
+              <a:rPr lang="en" u="sng">
+                <a:solidFill>
+                  <a:schemeClr val="hlink"/>
+                </a:solidFill>
+                <a:latin typeface="Consolas"/>
+                <a:ea typeface="Consolas"/>
+                <a:cs typeface="Consolas"/>
+                <a:sym typeface="Consolas"/>
+                <a:hlinkClick r:id="rId3"/>
+              </a:rPr>
+              <a:t>https://github.com/cloudfoundry-community</a:t>
+            </a:r>
+          </a:p>
+          <a:p>
+            <a:pPr indent="-381000" lvl="1" marL="914400" rtl="0">
+              <a:spcBef>
+                <a:spcPts val="0"/>
+              </a:spcBef>
+              <a:buClr>
+                <a:schemeClr val="lt2"/>
+              </a:buClr>
+              <a:buSzPct val="80000"/>
+              <a:buFont typeface="Courier New"/>
+              <a:buChar char="o"/>
+            </a:pPr>
+            <a:r>
+              <a:rPr lang="en">
+                <a:latin typeface="Consolas"/>
+                <a:ea typeface="Consolas"/>
+                <a:cs typeface="Consolas"/>
+                <a:sym typeface="Consolas"/>
+              </a:rPr>
+              <a:t>100+ repos	 </a:t>
             </a:r>
           </a:p>
           <a:p>
@@ -8941,7 +8720,82 @@
                 <a:cs typeface="Consolas"/>
                 <a:sym typeface="Consolas"/>
               </a:rPr>
-              <a:t>Add the Platform teams</a:t>
+              <a:t>CF Platform teams</a:t>
+            </a:r>
+          </a:p>
+          <a:p>
+            <a:pPr indent="-381000" lvl="1" marL="914400" rtl="0">
+              <a:spcBef>
+                <a:spcPts val="0"/>
+              </a:spcBef>
+              <a:buClr>
+                <a:schemeClr val="lt2"/>
+              </a:buClr>
+              <a:buSzPct val="80000"/>
+              <a:buFont typeface="Courier New"/>
+              <a:buChar char="o"/>
+            </a:pPr>
+            <a:r>
+              <a:rPr lang="en">
+                <a:latin typeface="Consolas"/>
+                <a:ea typeface="Consolas"/>
+                <a:cs typeface="Consolas"/>
+                <a:sym typeface="Consolas"/>
+              </a:rPr>
+              <a:t>BOSH Releases for the newest tech</a:t>
+            </a:r>
+          </a:p>
+          <a:p>
+            <a:pPr indent="-381000" lvl="1" marL="914400" rtl="0">
+              <a:spcBef>
+                <a:spcPts val="0"/>
+              </a:spcBef>
+              <a:buClr>
+                <a:schemeClr val="lt2"/>
+              </a:buClr>
+              <a:buSzPct val="80000"/>
+              <a:buFont typeface="Courier New"/>
+              <a:buChar char="o"/>
+            </a:pPr>
+            <a:r>
+              <a:rPr lang="en">
+                <a:latin typeface="Consolas"/>
+                <a:ea typeface="Consolas"/>
+                <a:cs typeface="Consolas"/>
+                <a:sym typeface="Consolas"/>
+              </a:rPr>
+              <a:t>Various Docker releases</a:t>
+            </a:r>
+          </a:p>
+          <a:p>
+            <a:pPr indent="-381000" lvl="1" marL="914400" rtl="0">
+              <a:spcBef>
+                <a:spcPts val="0"/>
+              </a:spcBef>
+              <a:buClr>
+                <a:schemeClr val="lt2"/>
+              </a:buClr>
+              <a:buSzPct val="80000"/>
+              <a:buFont typeface="Courier New"/>
+              <a:buChar char="o"/>
+            </a:pPr>
+            <a:r>
+              <a:rPr lang="en">
+                <a:latin typeface="Consolas"/>
+                <a:ea typeface="Consolas"/>
+                <a:cs typeface="Consolas"/>
+                <a:sym typeface="Consolas"/>
+              </a:rPr>
+              <a:t>Alpha GCE CPI for BOSH </a:t>
+            </a:r>
+            <a:r>
+              <a:rPr lang="en" u="sng">
+                <a:solidFill>
+                  <a:schemeClr val="hlink"/>
+                </a:solidFill>
+                <a:hlinkClick r:id="rId4"/>
+              </a:rPr>
+              <a:t>bosh-google-cpi</a:t>
             </a:r>
           </a:p>
         </p:txBody>
@@ -9128,291 +8982,6 @@
 </p:sld>
 </file>
 
-<file path=ppt/slides/slide18.xml><?xml version="1.0" encoding="utf-8"?>
-<p:sld xmlns:a="http://schemas.openxmlformats.org/drawingml/2006/main" xmlns:r="http://schemas.openxmlformats.org/officeDocument/2006/relationships" xmlns:mc="http://schemas.openxmlformats.org/markup-compatibility/2006" xmlns:mv="urn:schemas-microsoft-com:mac:vml" xmlns:p="http://schemas.openxmlformats.org/presentationml/2006/main" xmlns:c="http://schemas.openxmlformats.org/drawingml/2006/chart" xmlns:dgm="http://schemas.openxmlformats.org/drawingml/2006/diagram" xmlns:o="urn:schemas-microsoft-com:office:office" xmlns:v="urn:schemas-microsoft-com:vml" xmlns:pvml="urn:schemas-microsoft-com:office:powerpoint" xmlns:com="http://schemas.openxmlformats.org/drawingml/2006/compatibility" xmlns:p14="http://schemas.microsoft.com/office/powerpoint/2010/main">
-  <p:cSld>
-    <p:spTree>
-      <p:nvGrpSpPr>
-        <p:cNvPr id="176" name="Shape 176"/>
-        <p:cNvGrpSpPr/>
-        <p:nvPr/>
-      </p:nvGrpSpPr>
-      <p:grpSpPr>
-        <a:xfrm>
-          <a:off x="0" y="0"/>
-          <a:ext cx="0" cy="0"/>
-          <a:chOff x="0" y="0"/>
-          <a:chExt cx="0" cy="0"/>
-        </a:xfrm>
-      </p:grpSpPr>
-      <p:sp>
-        <p:nvSpPr>
-          <p:cNvPr id="177" name="Shape 177"/>
-          <p:cNvSpPr txBox="1"/>
-          <p:nvPr>
-            <p:ph type="title"/>
-          </p:nvPr>
-        </p:nvSpPr>
-        <p:spPr>
-          <a:xfrm rot="-228134">
-            <a:off x="1184357" y="-16296"/>
-            <a:ext cx="8215583" cy="859729"/>
-          </a:xfrm>
-          <a:prstGeom prst="rect">
-            <a:avLst/>
-          </a:prstGeom>
-        </p:spPr>
-        <p:txBody>
-          <a:bodyPr anchorCtr="0" anchor="ctr" bIns="91425" lIns="91425" rIns="91425" tIns="91425">
-            <a:noAutofit/>
-          </a:bodyPr>
-          <a:lstStyle/>
-          <a:p>
-            <a:pPr lvl="0" rtl="0">
-              <a:spcBef>
-                <a:spcPts val="0"/>
-              </a:spcBef>
-              <a:buNone/>
-            </a:pPr>
-            <a:r>
-              <a:rPr lang="en"/>
-              <a:t>Graveyard below here</a:t>
-            </a:r>
-          </a:p>
-        </p:txBody>
-      </p:sp>
-      <p:sp>
-        <p:nvSpPr>
-          <p:cNvPr id="178" name="Shape 178"/>
-          <p:cNvSpPr txBox="1"/>
-          <p:nvPr>
-            <p:ph idx="1" type="body"/>
-          </p:nvPr>
-        </p:nvSpPr>
-        <p:spPr>
-          <a:xfrm>
-            <a:off x="457200" y="1200150"/>
-            <a:ext cx="8229600" cy="3394500"/>
-          </a:xfrm>
-          <a:prstGeom prst="rect">
-            <a:avLst/>
-          </a:prstGeom>
-        </p:spPr>
-        <p:txBody>
-          <a:bodyPr anchorCtr="0" anchor="t" bIns="91425" lIns="91425" rIns="91425" tIns="91425">
-            <a:noAutofit/>
-          </a:bodyPr>
-          <a:lstStyle/>
-          <a:p>
-            <a:pPr indent="-419100" lvl="0" marL="457200" rtl="0">
-              <a:spcBef>
-                <a:spcPts val="0"/>
-              </a:spcBef>
-              <a:buClr>
-                <a:schemeClr val="lt2"/>
-              </a:buClr>
-              <a:buFont typeface="Arial"/>
-              <a:buChar char="●"/>
-            </a:pPr>
-            <a:r>
-              <a:t/>
-            </a:r>
-            <a:endParaRPr>
-              <a:latin typeface="Consolas"/>
-              <a:ea typeface="Consolas"/>
-              <a:cs typeface="Consolas"/>
-              <a:sym typeface="Consolas"/>
-            </a:endParaRPr>
-          </a:p>
-        </p:txBody>
-      </p:sp>
-    </p:spTree>
-  </p:cSld>
-  <p:clrMapOvr>
-    <a:masterClrMapping/>
-  </p:clrMapOvr>
-  <p:transition spd="slow">
-    <p:cut/>
-  </p:transition>
-</p:sld>
-</file>
-
-<file path=ppt/slides/slide19.xml><?xml version="1.0" encoding="utf-8"?>
-<p:sld xmlns:a="http://schemas.openxmlformats.org/drawingml/2006/main" xmlns:r="http://schemas.openxmlformats.org/officeDocument/2006/relationships" xmlns:mc="http://schemas.openxmlformats.org/markup-compatibility/2006" xmlns:mv="urn:schemas-microsoft-com:mac:vml" xmlns:p="http://schemas.openxmlformats.org/presentationml/2006/main" xmlns:c="http://schemas.openxmlformats.org/drawingml/2006/chart" xmlns:dgm="http://schemas.openxmlformats.org/drawingml/2006/diagram" xmlns:o="urn:schemas-microsoft-com:office:office" xmlns:v="urn:schemas-microsoft-com:vml" xmlns:pvml="urn:schemas-microsoft-com:office:powerpoint" xmlns:com="http://schemas.openxmlformats.org/drawingml/2006/compatibility" xmlns:p14="http://schemas.microsoft.com/office/powerpoint/2010/main">
-  <p:cSld>
-    <p:spTree>
-      <p:nvGrpSpPr>
-        <p:cNvPr id="182" name="Shape 182"/>
-        <p:cNvGrpSpPr/>
-        <p:nvPr/>
-      </p:nvGrpSpPr>
-      <p:grpSpPr>
-        <a:xfrm>
-          <a:off x="0" y="0"/>
-          <a:ext cx="0" cy="0"/>
-          <a:chOff x="0" y="0"/>
-          <a:chExt cx="0" cy="0"/>
-        </a:xfrm>
-      </p:grpSpPr>
-      <p:sp>
-        <p:nvSpPr>
-          <p:cNvPr id="183" name="Shape 183"/>
-          <p:cNvSpPr txBox="1"/>
-          <p:nvPr>
-            <p:ph type="title"/>
-          </p:nvPr>
-        </p:nvSpPr>
-        <p:spPr>
-          <a:xfrm rot="-228134">
-            <a:off x="1184357" y="-16296"/>
-            <a:ext cx="8215583" cy="859729"/>
-          </a:xfrm>
-          <a:prstGeom prst="rect">
-            <a:avLst/>
-          </a:prstGeom>
-        </p:spPr>
-        <p:txBody>
-          <a:bodyPr anchorCtr="0" anchor="ctr" bIns="91425" lIns="91425" rIns="91425" tIns="91425">
-            <a:noAutofit/>
-          </a:bodyPr>
-          <a:lstStyle/>
-          <a:p>
-            <a:pPr lvl="0" rtl="0">
-              <a:spcBef>
-                <a:spcPts val="0"/>
-              </a:spcBef>
-              <a:buNone/>
-            </a:pPr>
-            <a:r>
-              <a:rPr lang="en"/>
-              <a:t>BOSH agent environment</a:t>
-            </a:r>
-          </a:p>
-        </p:txBody>
-      </p:sp>
-      <p:sp>
-        <p:nvSpPr>
-          <p:cNvPr id="184" name="Shape 184"/>
-          <p:cNvSpPr txBox="1"/>
-          <p:nvPr>
-            <p:ph idx="1" type="body"/>
-          </p:nvPr>
-        </p:nvSpPr>
-        <p:spPr>
-          <a:xfrm>
-            <a:off x="457200" y="1200150"/>
-            <a:ext cx="8229600" cy="3394500"/>
-          </a:xfrm>
-          <a:prstGeom prst="rect">
-            <a:avLst/>
-          </a:prstGeom>
-        </p:spPr>
-        <p:txBody>
-          <a:bodyPr anchorCtr="0" anchor="t" bIns="91425" lIns="91425" rIns="91425" tIns="91425">
-            <a:noAutofit/>
-          </a:bodyPr>
-          <a:lstStyle/>
-          <a:p>
-            <a:pPr indent="-419100" lvl="0" marL="457200" rtl="0">
-              <a:spcBef>
-                <a:spcPts val="0"/>
-              </a:spcBef>
-              <a:buClr>
-                <a:schemeClr val="lt2"/>
-              </a:buClr>
-              <a:buSzPct val="100000"/>
-              <a:buFont typeface="Arial"/>
-              <a:buChar char="●"/>
-            </a:pPr>
-            <a:r>
-              <a:rPr lang="en">
-                <a:latin typeface="Consolas"/>
-                <a:ea typeface="Consolas"/>
-                <a:cs typeface="Consolas"/>
-                <a:sym typeface="Consolas"/>
-              </a:rPr>
-              <a:t>/var/vcap/ tree</a:t>
-            </a:r>
-          </a:p>
-          <a:p>
-            <a:pPr indent="-419100" lvl="0" marL="457200" rtl="0">
-              <a:spcBef>
-                <a:spcPts val="0"/>
-              </a:spcBef>
-              <a:buClr>
-                <a:schemeClr val="lt2"/>
-              </a:buClr>
-              <a:buSzPct val="100000"/>
-              <a:buFont typeface="Arial"/>
-              <a:buChar char="●"/>
-            </a:pPr>
-            <a:r>
-              <a:rPr lang="en">
-                <a:latin typeface="Consolas"/>
-                <a:ea typeface="Consolas"/>
-                <a:cs typeface="Consolas"/>
-                <a:sym typeface="Consolas"/>
-              </a:rPr>
-              <a:t>jobs, packages and logs</a:t>
-            </a:r>
-          </a:p>
-          <a:p>
-            <a:pPr indent="-419100" lvl="0" marL="457200" rtl="0">
-              <a:spcBef>
-                <a:spcPts val="0"/>
-              </a:spcBef>
-              <a:buClr>
-                <a:schemeClr val="lt2"/>
-              </a:buClr>
-              <a:buSzPct val="100000"/>
-              <a:buFont typeface="Arial"/>
-              <a:buChar char="●"/>
-            </a:pPr>
-            <a:r>
-              <a:rPr lang="en">
-                <a:latin typeface="Consolas"/>
-                <a:ea typeface="Consolas"/>
-                <a:cs typeface="Consolas"/>
-                <a:sym typeface="Consolas"/>
-              </a:rPr>
-              <a:t>monit for jobs</a:t>
-            </a:r>
-          </a:p>
-          <a:p>
-            <a:pPr indent="-419100" lvl="0" marL="457200" rtl="0">
-              <a:spcBef>
-                <a:spcPts val="0"/>
-              </a:spcBef>
-              <a:buClr>
-                <a:schemeClr val="lt2"/>
-              </a:buClr>
-              <a:buSzPct val="100000"/>
-              <a:buFont typeface="Arial"/>
-              <a:buChar char="●"/>
-            </a:pPr>
-            <a:r>
-              <a:rPr lang="en">
-                <a:latin typeface="Consolas"/>
-                <a:ea typeface="Consolas"/>
-                <a:cs typeface="Consolas"/>
-                <a:sym typeface="Consolas"/>
-              </a:rPr>
-              <a:t>runit for the agent</a:t>
-            </a:r>
-          </a:p>
-        </p:txBody>
-      </p:sp>
-    </p:spTree>
-  </p:cSld>
-  <p:clrMapOvr>
-    <a:masterClrMapping/>
-  </p:clrMapOvr>
-  <p:transition spd="slow">
-    <p:cut/>
-  </p:transition>
-</p:sld>
-</file>
-
 <file path=ppt/slides/slide2.xml><?xml version="1.0" encoding="utf-8"?>
 <p:sld xmlns:a="http://schemas.openxmlformats.org/drawingml/2006/main" xmlns:r="http://schemas.openxmlformats.org/officeDocument/2006/relationships" xmlns:mc="http://schemas.openxmlformats.org/markup-compatibility/2006" xmlns:mv="urn:schemas-microsoft-com:mac:vml" xmlns:p="http://schemas.openxmlformats.org/presentationml/2006/main" xmlns:c="http://schemas.openxmlformats.org/drawingml/2006/chart" xmlns:dgm="http://schemas.openxmlformats.org/drawingml/2006/diagram" xmlns:o="urn:schemas-microsoft-com:office:office" xmlns:v="urn:schemas-microsoft-com:vml" xmlns:pvml="urn:schemas-microsoft-com:office:powerpoint" xmlns:com="http://schemas.openxmlformats.org/drawingml/2006/compatibility" xmlns:p14="http://schemas.microsoft.com/office/powerpoint/2010/main">
   <p:cSld>
@@ -9502,7 +9071,7 @@
             </a:pPr>
             <a:r>
               <a:rPr lang="en"/>
-              <a:t>Sign in and get an IP from &lt;someone&gt; </a:t>
+              <a:t>Get an IP from the list on-screen </a:t>
             </a:r>
           </a:p>
           <a:p>
@@ -9555,115 +9124,6 @@
               <a:rPr lang="en"/>
               <a:t>There are several CF staff to help you</a:t>
             </a:r>
-          </a:p>
-        </p:txBody>
-      </p:sp>
-    </p:spTree>
-  </p:cSld>
-  <p:clrMapOvr>
-    <a:masterClrMapping/>
-  </p:clrMapOvr>
-  <p:transition spd="slow">
-    <p:cut/>
-  </p:transition>
-</p:sld>
-</file>
-
-<file path=ppt/slides/slide20.xml><?xml version="1.0" encoding="utf-8"?>
-<p:sld xmlns:a="http://schemas.openxmlformats.org/drawingml/2006/main" xmlns:r="http://schemas.openxmlformats.org/officeDocument/2006/relationships" xmlns:mc="http://schemas.openxmlformats.org/markup-compatibility/2006" xmlns:mv="urn:schemas-microsoft-com:mac:vml" xmlns:p="http://schemas.openxmlformats.org/presentationml/2006/main" xmlns:c="http://schemas.openxmlformats.org/drawingml/2006/chart" xmlns:dgm="http://schemas.openxmlformats.org/drawingml/2006/diagram" xmlns:o="urn:schemas-microsoft-com:office:office" xmlns:v="urn:schemas-microsoft-com:vml" xmlns:pvml="urn:schemas-microsoft-com:office:powerpoint" xmlns:com="http://schemas.openxmlformats.org/drawingml/2006/compatibility" xmlns:p14="http://schemas.microsoft.com/office/powerpoint/2010/main">
-  <p:cSld>
-    <p:spTree>
-      <p:nvGrpSpPr>
-        <p:cNvPr id="188" name="Shape 188"/>
-        <p:cNvGrpSpPr/>
-        <p:nvPr/>
-      </p:nvGrpSpPr>
-      <p:grpSpPr>
-        <a:xfrm>
-          <a:off x="0" y="0"/>
-          <a:ext cx="0" cy="0"/>
-          <a:chOff x="0" y="0"/>
-          <a:chExt cx="0" cy="0"/>
-        </a:xfrm>
-      </p:grpSpPr>
-      <p:sp>
-        <p:nvSpPr>
-          <p:cNvPr id="189" name="Shape 189"/>
-          <p:cNvSpPr txBox="1"/>
-          <p:nvPr>
-            <p:ph type="title"/>
-          </p:nvPr>
-        </p:nvSpPr>
-        <p:spPr>
-          <a:xfrm rot="-228134">
-            <a:off x="1184357" y="-16296"/>
-            <a:ext cx="8215583" cy="859729"/>
-          </a:xfrm>
-          <a:prstGeom prst="rect">
-            <a:avLst/>
-          </a:prstGeom>
-        </p:spPr>
-        <p:txBody>
-          <a:bodyPr anchorCtr="0" anchor="ctr" bIns="91425" lIns="91425" rIns="91425" tIns="91425">
-            <a:noAutofit/>
-          </a:bodyPr>
-          <a:lstStyle/>
-          <a:p>
-            <a:pPr lvl="0" rtl="0">
-              <a:spcBef>
-                <a:spcPts val="0"/>
-              </a:spcBef>
-              <a:buNone/>
-            </a:pPr>
-            <a:r>
-              <a:rPr lang="en"/>
-              <a:t>Getting logs</a:t>
-            </a:r>
-          </a:p>
-        </p:txBody>
-      </p:sp>
-      <p:sp>
-        <p:nvSpPr>
-          <p:cNvPr id="190" name="Shape 190"/>
-          <p:cNvSpPr txBox="1"/>
-          <p:nvPr>
-            <p:ph idx="1" type="body"/>
-          </p:nvPr>
-        </p:nvSpPr>
-        <p:spPr>
-          <a:xfrm>
-            <a:off x="457200" y="1200150"/>
-            <a:ext cx="8229600" cy="3394500"/>
-          </a:xfrm>
-          <a:prstGeom prst="rect">
-            <a:avLst/>
-          </a:prstGeom>
-        </p:spPr>
-        <p:txBody>
-          <a:bodyPr anchorCtr="0" anchor="t" bIns="91425" lIns="91425" rIns="91425" tIns="91425">
-            <a:noAutofit/>
-          </a:bodyPr>
-          <a:lstStyle/>
-          <a:p>
-            <a:pPr indent="-419100" lvl="0" marL="457200" rtl="0">
-              <a:spcBef>
-                <a:spcPts val="0"/>
-              </a:spcBef>
-              <a:buClr>
-                <a:schemeClr val="lt2"/>
-              </a:buClr>
-              <a:buFont typeface="Arial"/>
-              <a:buChar char="●"/>
-            </a:pPr>
-            <a:r>
-              <a:t/>
-            </a:r>
-            <a:endParaRPr>
-              <a:latin typeface="Consolas"/>
-              <a:ea typeface="Consolas"/>
-              <a:cs typeface="Consolas"/>
-              <a:sym typeface="Consolas"/>
-            </a:endParaRPr>
           </a:p>
         </p:txBody>
       </p:sp>
@@ -9726,7 +9186,7 @@
             </a:pPr>
             <a:r>
               <a:rPr lang="en"/>
-              <a:t>Login and verify (by 6:45)</a:t>
+              <a:t>Login and verify (within 15 min)</a:t>
             </a:r>
           </a:p>
         </p:txBody>
@@ -10999,560 +10459,6 @@
 </file>
 
 <file path=ppt/theme/theme1.xml><?xml version="1.0" encoding="utf-8"?>
-<a:theme xmlns:a="http://schemas.openxmlformats.org/drawingml/2006/main" xmlns:r="http://schemas.openxmlformats.org/officeDocument/2006/relationships" name="Custom Theme">
-  <a:themeElements>
-    <a:clrScheme name="Default">
-      <a:dk1>
-        <a:srgbClr val="000000"/>
-      </a:dk1>
-      <a:lt1>
-        <a:srgbClr val="FFFFFF"/>
-      </a:lt1>
-      <a:dk2>
-        <a:srgbClr val="158158"/>
-      </a:dk2>
-      <a:lt2>
-        <a:srgbClr val="F3F3F3"/>
-      </a:lt2>
-      <a:accent1>
-        <a:srgbClr val="058DC7"/>
-      </a:accent1>
-      <a:accent2>
-        <a:srgbClr val="50B432"/>
-      </a:accent2>
-      <a:accent3>
-        <a:srgbClr val="ED561B"/>
-      </a:accent3>
-      <a:accent4>
-        <a:srgbClr val="EDEF00"/>
-      </a:accent4>
-      <a:accent5>
-        <a:srgbClr val="24CBE5"/>
-      </a:accent5>
-      <a:accent6>
-        <a:srgbClr val="64E572"/>
-      </a:accent6>
-      <a:hlink>
-        <a:srgbClr val="2200CC"/>
-      </a:hlink>
-      <a:folHlink>
-        <a:srgbClr val="551A8B"/>
-      </a:folHlink>
-    </a:clrScheme>
-    <a:fontScheme name="Office">
-      <a:majorFont>
-        <a:latin typeface="Arial"/>
-        <a:ea typeface=""/>
-        <a:cs typeface=""/>
-        <a:font script="Jpan" typeface="ＭＳ Ｐゴシック"/>
-        <a:font script="Hang" typeface="맑은 고딕"/>
-        <a:font script="Hans" typeface="宋体"/>
-        <a:font script="Hant" typeface="新細明體"/>
-        <a:font script="Arab" typeface="Times New Roman"/>
-        <a:font script="Hebr" typeface="Times New Roman"/>
-        <a:font script="Thai" typeface="Angsana New"/>
-        <a:font script="Ethi" typeface="Nyala"/>
-        <a:font script="Beng" typeface="Vrinda"/>
-        <a:font script="Gujr" typeface="Shruti"/>
-        <a:font script="Khmr" typeface="MoolBoran"/>
-        <a:font script="Knda" typeface="Tunga"/>
-        <a:font script="Guru" typeface="Raavi"/>
-        <a:font script="Cans" typeface="Euphemia"/>
-        <a:font script="Cher" typeface="Plantagenet Cherokee"/>
-        <a:font script="Yiii" typeface="Microsoft Yi Baiti"/>
-        <a:font script="Tibt" typeface="Microsoft Himalaya"/>
-        <a:font script="Thaa" typeface="MV Boli"/>
-        <a:font script="Deva" typeface="Mangal"/>
-        <a:font script="Telu" typeface="Gautami"/>
-        <a:font script="Taml" typeface="Latha"/>
-        <a:font script="Syrc" typeface="Estrangelo Edessa"/>
-        <a:font script="Orya" typeface="Kalinga"/>
-        <a:font script="Mlym" typeface="Kartika"/>
-        <a:font script="Laoo" typeface="DokChampa"/>
-        <a:font script="Sinh" typeface="Iskoola Pota"/>
-        <a:font script="Mong" typeface="Mongolian Baiti"/>
-        <a:font script="Viet" typeface="Times New Roman"/>
-        <a:font script="Uigh" typeface="Microsoft Uighur"/>
-      </a:majorFont>
-      <a:minorFont>
-        <a:latin typeface="Arial"/>
-        <a:ea typeface=""/>
-        <a:cs typeface=""/>
-        <a:font script="Jpan" typeface="ＭＳ Ｐゴシック"/>
-        <a:font script="Hang" typeface="맑은 고딕"/>
-        <a:font script="Hans" typeface="宋体"/>
-        <a:font script="Hant" typeface="新細明體"/>
-        <a:font script="Arab" typeface="Times New Roman"/>
-        <a:font script="Hebr" typeface="Times New Roman"/>
-        <a:font script="Thai" typeface="Angsana New"/>
-        <a:font script="Ethi" typeface="Nyala"/>
-        <a:font script="Beng" typeface="Vrinda"/>
-        <a:font script="Gujr" typeface="Shruti"/>
-        <a:font script="Khmr" typeface="MoolBoran"/>
-        <a:font script="Knda" typeface="Tunga"/>
-        <a:font script="Guru" typeface="Raavi"/>
-        <a:font script="Cans" typeface="Euphemia"/>
-        <a:font script="Cher" typeface="Plantagenet Cherokee"/>
-        <a:font script="Yiii" typeface="Microsoft Yi Baiti"/>
-        <a:font script="Tibt" typeface="Microsoft Himalaya"/>
-        <a:font script="Thaa" typeface="MV Boli"/>
-        <a:font script="Deva" typeface="Mangal"/>
-        <a:font script="Telu" typeface="Gautami"/>
-        <a:font script="Taml" typeface="Latha"/>
-        <a:font script="Syrc" typeface="Estrangelo Edessa"/>
-        <a:font script="Orya" typeface="Kalinga"/>
-        <a:font script="Mlym" typeface="Kartika"/>
-        <a:font script="Laoo" typeface="DokChampa"/>
-        <a:font script="Sinh" typeface="Iskoola Pota"/>
-        <a:font script="Mong" typeface="Mongolian Baiti"/>
-        <a:font script="Viet" typeface="Times New Roman"/>
-        <a:font script="Uigh" typeface="Microsoft Uighur"/>
-      </a:minorFont>
-    </a:fontScheme>
-    <a:fmtScheme name="Office">
-      <a:fillStyleLst>
-        <a:solidFill>
-          <a:schemeClr val="phClr"/>
-        </a:solidFill>
-        <a:gradFill rotWithShape="1">
-          <a:gsLst>
-            <a:gs pos="0">
-              <a:schemeClr val="phClr">
-                <a:tint val="50000"/>
-                <a:satMod val="300000"/>
-              </a:schemeClr>
-            </a:gs>
-            <a:gs pos="35000">
-              <a:schemeClr val="phClr">
-                <a:tint val="37000"/>
-                <a:satMod val="300000"/>
-              </a:schemeClr>
-            </a:gs>
-            <a:gs pos="100000">
-              <a:schemeClr val="phClr">
-                <a:tint val="15000"/>
-                <a:satMod val="350000"/>
-              </a:schemeClr>
-            </a:gs>
-          </a:gsLst>
-          <a:lin ang="16200000" scaled="1"/>
-        </a:gradFill>
-        <a:gradFill rotWithShape="1">
-          <a:gsLst>
-            <a:gs pos="0">
-              <a:schemeClr val="phClr">
-                <a:tint val="100000"/>
-                <a:shade val="100000"/>
-                <a:satMod val="130000"/>
-              </a:schemeClr>
-            </a:gs>
-            <a:gs pos="100000">
-              <a:schemeClr val="phClr">
-                <a:tint val="50000"/>
-                <a:shade val="100000"/>
-                <a:satMod val="350000"/>
-              </a:schemeClr>
-            </a:gs>
-          </a:gsLst>
-          <a:lin ang="16200000" scaled="0"/>
-        </a:gradFill>
-      </a:fillStyleLst>
-      <a:lnStyleLst>
-        <a:ln cap="flat" cmpd="sng" w="9525" algn="ctr">
-          <a:solidFill>
-            <a:schemeClr val="phClr">
-              <a:shade val="95000"/>
-              <a:satMod val="105000"/>
-            </a:schemeClr>
-          </a:solidFill>
-          <a:prstDash val="solid"/>
-        </a:ln>
-        <a:ln cap="flat" cmpd="sng" w="25400" algn="ctr">
-          <a:solidFill>
-            <a:schemeClr val="phClr"/>
-          </a:solidFill>
-          <a:prstDash val="solid"/>
-        </a:ln>
-        <a:ln cap="flat" cmpd="sng" w="38100" algn="ctr">
-          <a:solidFill>
-            <a:schemeClr val="phClr"/>
-          </a:solidFill>
-          <a:prstDash val="solid"/>
-        </a:ln>
-      </a:lnStyleLst>
-      <a:effectStyleLst>
-        <a:effectStyle>
-          <a:effectLst>
-            <a:outerShdw blurRad="40000" rotWithShape="0" dir="5400000" dist="20000">
-              <a:srgbClr val="000000">
-                <a:alpha val="38000"/>
-              </a:srgbClr>
-            </a:outerShdw>
-          </a:effectLst>
-        </a:effectStyle>
-        <a:effectStyle>
-          <a:effectLst>
-            <a:outerShdw blurRad="40000" rotWithShape="0" dir="5400000" dist="23000">
-              <a:srgbClr val="000000">
-                <a:alpha val="35000"/>
-              </a:srgbClr>
-            </a:outerShdw>
-          </a:effectLst>
-        </a:effectStyle>
-        <a:effectStyle>
-          <a:effectLst>
-            <a:outerShdw blurRad="40000" rotWithShape="0" dir="5400000" dist="23000">
-              <a:srgbClr val="000000">
-                <a:alpha val="35000"/>
-              </a:srgbClr>
-            </a:outerShdw>
-          </a:effectLst>
-          <a:scene3d>
-            <a:camera prst="orthographicFront">
-              <a:rot lat="0" lon="0" rev="0"/>
-            </a:camera>
-            <a:lightRig dir="t" rig="threePt">
-              <a:rot lat="0" lon="0" rev="1200000"/>
-            </a:lightRig>
-          </a:scene3d>
-          <a:sp3d>
-            <a:bevelT h="25400" w="63500"/>
-          </a:sp3d>
-        </a:effectStyle>
-      </a:effectStyleLst>
-      <a:bgFillStyleLst>
-        <a:solidFill>
-          <a:schemeClr val="phClr"/>
-        </a:solidFill>
-        <a:gradFill rotWithShape="1">
-          <a:gsLst>
-            <a:gs pos="0">
-              <a:schemeClr val="phClr">
-                <a:tint val="40000"/>
-                <a:satMod val="350000"/>
-              </a:schemeClr>
-            </a:gs>
-            <a:gs pos="40000">
-              <a:schemeClr val="phClr">
-                <a:tint val="45000"/>
-                <a:shade val="99000"/>
-                <a:satMod val="350000"/>
-              </a:schemeClr>
-            </a:gs>
-            <a:gs pos="100000">
-              <a:schemeClr val="phClr">
-                <a:shade val="20000"/>
-                <a:satMod val="255000"/>
-              </a:schemeClr>
-            </a:gs>
-          </a:gsLst>
-          <a:path path="circle">
-            <a:fillToRect b="180000" l="50000" r="50000" t="-80000"/>
-          </a:path>
-        </a:gradFill>
-        <a:gradFill rotWithShape="1">
-          <a:gsLst>
-            <a:gs pos="0">
-              <a:schemeClr val="phClr">
-                <a:tint val="80000"/>
-                <a:satMod val="300000"/>
-              </a:schemeClr>
-            </a:gs>
-            <a:gs pos="100000">
-              <a:schemeClr val="phClr">
-                <a:shade val="30000"/>
-                <a:satMod val="200000"/>
-              </a:schemeClr>
-            </a:gs>
-          </a:gsLst>
-          <a:path path="circle">
-            <a:fillToRect b="50000" l="50000" r="50000" t="50000"/>
-          </a:path>
-        </a:gradFill>
-      </a:bgFillStyleLst>
-    </a:fmtScheme>
-  </a:themeElements>
-</a:theme>
-</file>
-
-<file path=ppt/theme/theme2.xml><?xml version="1.0" encoding="utf-8"?>
-<a:theme xmlns:a="http://schemas.openxmlformats.org/drawingml/2006/main" xmlns:r="http://schemas.openxmlformats.org/officeDocument/2006/relationships" name="friendly">
-  <a:themeElements>
-    <a:clrScheme name="Custom 432">
-      <a:dk1>
-        <a:srgbClr val="CA0001"/>
-      </a:dk1>
-      <a:lt1>
-        <a:srgbClr val="ECE47C"/>
-      </a:lt1>
-      <a:dk2>
-        <a:srgbClr val="000000"/>
-      </a:dk2>
-      <a:lt2>
-        <a:srgbClr val="FFFFFF"/>
-      </a:lt2>
-      <a:accent1>
-        <a:srgbClr val="E26F01"/>
-      </a:accent1>
-      <a:accent2>
-        <a:srgbClr val="723C75"/>
-      </a:accent2>
-      <a:accent3>
-        <a:srgbClr val="69B19F"/>
-      </a:accent3>
-      <a:accent4>
-        <a:srgbClr val="BC5828"/>
-      </a:accent4>
-      <a:accent5>
-        <a:srgbClr val="800000"/>
-      </a:accent5>
-      <a:accent6>
-        <a:srgbClr val="333333"/>
-      </a:accent6>
-      <a:hlink>
-        <a:srgbClr val="ECE47C"/>
-      </a:hlink>
-      <a:folHlink>
-        <a:srgbClr val="FF5100"/>
-      </a:folHlink>
-    </a:clrScheme>
-    <a:fontScheme name="Office">
-      <a:majorFont>
-        <a:latin typeface="Arial"/>
-        <a:ea typeface=""/>
-        <a:cs typeface=""/>
-        <a:font script="Jpan" typeface="ＭＳ Ｐゴシック"/>
-        <a:font script="Hang" typeface="맑은 고딕"/>
-        <a:font script="Hans" typeface="宋体"/>
-        <a:font script="Hant" typeface="新細明體"/>
-        <a:font script="Arab" typeface="Times New Roman"/>
-        <a:font script="Hebr" typeface="Times New Roman"/>
-        <a:font script="Thai" typeface="Angsana New"/>
-        <a:font script="Ethi" typeface="Nyala"/>
-        <a:font script="Beng" typeface="Vrinda"/>
-        <a:font script="Gujr" typeface="Shruti"/>
-        <a:font script="Khmr" typeface="MoolBoran"/>
-        <a:font script="Knda" typeface="Tunga"/>
-        <a:font script="Guru" typeface="Raavi"/>
-        <a:font script="Cans" typeface="Euphemia"/>
-        <a:font script="Cher" typeface="Plantagenet Cherokee"/>
-        <a:font script="Yiii" typeface="Microsoft Yi Baiti"/>
-        <a:font script="Tibt" typeface="Microsoft Himalaya"/>
-        <a:font script="Thaa" typeface="MV Boli"/>
-        <a:font script="Deva" typeface="Mangal"/>
-        <a:font script="Telu" typeface="Gautami"/>
-        <a:font script="Taml" typeface="Latha"/>
-        <a:font script="Syrc" typeface="Estrangelo Edessa"/>
-        <a:font script="Orya" typeface="Kalinga"/>
-        <a:font script="Mlym" typeface="Kartika"/>
-        <a:font script="Laoo" typeface="DokChampa"/>
-        <a:font script="Sinh" typeface="Iskoola Pota"/>
-        <a:font script="Mong" typeface="Mongolian Baiti"/>
-        <a:font script="Viet" typeface="Times New Roman"/>
-        <a:font script="Uigh" typeface="Microsoft Uighur"/>
-      </a:majorFont>
-      <a:minorFont>
-        <a:latin typeface="Arial"/>
-        <a:ea typeface=""/>
-        <a:cs typeface=""/>
-        <a:font script="Jpan" typeface="ＭＳ Ｐゴシック"/>
-        <a:font script="Hang" typeface="맑은 고딕"/>
-        <a:font script="Hans" typeface="宋体"/>
-        <a:font script="Hant" typeface="新細明體"/>
-        <a:font script="Arab" typeface="Times New Roman"/>
-        <a:font script="Hebr" typeface="Times New Roman"/>
-        <a:font script="Thai" typeface="Angsana New"/>
-        <a:font script="Ethi" typeface="Nyala"/>
-        <a:font script="Beng" typeface="Vrinda"/>
-        <a:font script="Gujr" typeface="Shruti"/>
-        <a:font script="Khmr" typeface="MoolBoran"/>
-        <a:font script="Knda" typeface="Tunga"/>
-        <a:font script="Guru" typeface="Raavi"/>
-        <a:font script="Cans" typeface="Euphemia"/>
-        <a:font script="Cher" typeface="Plantagenet Cherokee"/>
-        <a:font script="Yiii" typeface="Microsoft Yi Baiti"/>
-        <a:font script="Tibt" typeface="Microsoft Himalaya"/>
-        <a:font script="Thaa" typeface="MV Boli"/>
-        <a:font script="Deva" typeface="Mangal"/>
-        <a:font script="Telu" typeface="Gautami"/>
-        <a:font script="Taml" typeface="Latha"/>
-        <a:font script="Syrc" typeface="Estrangelo Edessa"/>
-        <a:font script="Orya" typeface="Kalinga"/>
-        <a:font script="Mlym" typeface="Kartika"/>
-        <a:font script="Laoo" typeface="DokChampa"/>
-        <a:font script="Sinh" typeface="Iskoola Pota"/>
-        <a:font script="Mong" typeface="Mongolian Baiti"/>
-        <a:font script="Viet" typeface="Times New Roman"/>
-        <a:font script="Uigh" typeface="Microsoft Uighur"/>
-      </a:minorFont>
-    </a:fontScheme>
-    <a:fmtScheme name="Office">
-      <a:fillStyleLst>
-        <a:solidFill>
-          <a:schemeClr val="phClr"/>
-        </a:solidFill>
-        <a:gradFill rotWithShape="1">
-          <a:gsLst>
-            <a:gs pos="0">
-              <a:schemeClr val="phClr">
-                <a:tint val="50000"/>
-                <a:satMod val="300000"/>
-              </a:schemeClr>
-            </a:gs>
-            <a:gs pos="35000">
-              <a:schemeClr val="phClr">
-                <a:tint val="37000"/>
-                <a:satMod val="300000"/>
-              </a:schemeClr>
-            </a:gs>
-            <a:gs pos="100000">
-              <a:schemeClr val="phClr">
-                <a:tint val="15000"/>
-                <a:satMod val="350000"/>
-              </a:schemeClr>
-            </a:gs>
-          </a:gsLst>
-          <a:lin ang="16200000" scaled="1"/>
-        </a:gradFill>
-        <a:gradFill rotWithShape="1">
-          <a:gsLst>
-            <a:gs pos="0">
-              <a:schemeClr val="phClr">
-                <a:tint val="100000"/>
-                <a:shade val="100000"/>
-                <a:satMod val="130000"/>
-              </a:schemeClr>
-            </a:gs>
-            <a:gs pos="100000">
-              <a:schemeClr val="phClr">
-                <a:tint val="50000"/>
-                <a:shade val="100000"/>
-                <a:satMod val="350000"/>
-              </a:schemeClr>
-            </a:gs>
-          </a:gsLst>
-          <a:lin ang="16200000" scaled="0"/>
-        </a:gradFill>
-      </a:fillStyleLst>
-      <a:lnStyleLst>
-        <a:ln cap="flat" cmpd="sng" w="9525" algn="ctr">
-          <a:solidFill>
-            <a:schemeClr val="phClr">
-              <a:shade val="95000"/>
-              <a:satMod val="105000"/>
-            </a:schemeClr>
-          </a:solidFill>
-          <a:prstDash val="solid"/>
-        </a:ln>
-        <a:ln cap="flat" cmpd="sng" w="25400" algn="ctr">
-          <a:solidFill>
-            <a:schemeClr val="phClr"/>
-          </a:solidFill>
-          <a:prstDash val="solid"/>
-        </a:ln>
-        <a:ln cap="flat" cmpd="sng" w="38100" algn="ctr">
-          <a:solidFill>
-            <a:schemeClr val="phClr"/>
-          </a:solidFill>
-          <a:prstDash val="solid"/>
-        </a:ln>
-      </a:lnStyleLst>
-      <a:effectStyleLst>
-        <a:effectStyle>
-          <a:effectLst>
-            <a:outerShdw blurRad="40000" rotWithShape="0" dir="5400000" dist="20000">
-              <a:srgbClr val="000000">
-                <a:alpha val="38000"/>
-              </a:srgbClr>
-            </a:outerShdw>
-          </a:effectLst>
-        </a:effectStyle>
-        <a:effectStyle>
-          <a:effectLst>
-            <a:outerShdw blurRad="40000" rotWithShape="0" dir="5400000" dist="23000">
-              <a:srgbClr val="000000">
-                <a:alpha val="35000"/>
-              </a:srgbClr>
-            </a:outerShdw>
-          </a:effectLst>
-        </a:effectStyle>
-        <a:effectStyle>
-          <a:effectLst>
-            <a:outerShdw blurRad="40000" rotWithShape="0" dir="5400000" dist="23000">
-              <a:srgbClr val="000000">
-                <a:alpha val="35000"/>
-              </a:srgbClr>
-            </a:outerShdw>
-          </a:effectLst>
-          <a:scene3d>
-            <a:camera prst="orthographicFront">
-              <a:rot lat="0" lon="0" rev="0"/>
-            </a:camera>
-            <a:lightRig dir="t" rig="threePt">
-              <a:rot lat="0" lon="0" rev="1200000"/>
-            </a:lightRig>
-          </a:scene3d>
-          <a:sp3d>
-            <a:bevelT h="25400" w="63500"/>
-          </a:sp3d>
-        </a:effectStyle>
-      </a:effectStyleLst>
-      <a:bgFillStyleLst>
-        <a:solidFill>
-          <a:schemeClr val="phClr"/>
-        </a:solidFill>
-        <a:gradFill rotWithShape="1">
-          <a:gsLst>
-            <a:gs pos="0">
-              <a:schemeClr val="phClr">
-                <a:tint val="40000"/>
-                <a:satMod val="350000"/>
-              </a:schemeClr>
-            </a:gs>
-            <a:gs pos="40000">
-              <a:schemeClr val="phClr">
-                <a:tint val="45000"/>
-                <a:shade val="99000"/>
-                <a:satMod val="350000"/>
-              </a:schemeClr>
-            </a:gs>
-            <a:gs pos="100000">
-              <a:schemeClr val="phClr">
-                <a:shade val="20000"/>
-                <a:satMod val="255000"/>
-              </a:schemeClr>
-            </a:gs>
-          </a:gsLst>
-          <a:path path="circle">
-            <a:fillToRect b="180000" l="50000" r="50000" t="-80000"/>
-          </a:path>
-        </a:gradFill>
-        <a:gradFill rotWithShape="1">
-          <a:gsLst>
-            <a:gs pos="0">
-              <a:schemeClr val="phClr">
-                <a:tint val="80000"/>
-                <a:satMod val="300000"/>
-              </a:schemeClr>
-            </a:gs>
-            <a:gs pos="100000">
-              <a:schemeClr val="phClr">
-                <a:shade val="30000"/>
-                <a:satMod val="200000"/>
-              </a:schemeClr>
-            </a:gs>
-          </a:gsLst>
-          <a:path path="circle">
-            <a:fillToRect b="50000" l="50000" r="50000" t="50000"/>
-          </a:path>
-        </a:gradFill>
-      </a:bgFillStyleLst>
-    </a:fmtScheme>
-  </a:themeElements>
-</a:theme>
-</file>
-
-<file path=ppt/theme/theme3.xml><?xml version="1.0" encoding="utf-8"?>
 <a:theme xmlns:a="http://schemas.openxmlformats.org/drawingml/2006/main" xmlns:r="http://schemas.openxmlformats.org/officeDocument/2006/relationships" name="Office Theme">
   <a:themeElements>
     <a:clrScheme name="Office">
@@ -11867,4 +10773,558 @@
     </a:lnDef>
   </a:objectDefaults>
 </a:theme>
+</file>
+
+<file path=ppt/theme/theme2.xml><?xml version="1.0" encoding="utf-8"?>
+<a:theme xmlns:a="http://schemas.openxmlformats.org/drawingml/2006/main" xmlns:r="http://schemas.openxmlformats.org/officeDocument/2006/relationships" name="friendly">
+  <a:themeElements>
+    <a:clrScheme name="Custom 432">
+      <a:dk1>
+        <a:srgbClr val="CA0001"/>
+      </a:dk1>
+      <a:lt1>
+        <a:srgbClr val="ECE47C"/>
+      </a:lt1>
+      <a:dk2>
+        <a:srgbClr val="000000"/>
+      </a:dk2>
+      <a:lt2>
+        <a:srgbClr val="FFFFFF"/>
+      </a:lt2>
+      <a:accent1>
+        <a:srgbClr val="E26F01"/>
+      </a:accent1>
+      <a:accent2>
+        <a:srgbClr val="723C75"/>
+      </a:accent2>
+      <a:accent3>
+        <a:srgbClr val="69B19F"/>
+      </a:accent3>
+      <a:accent4>
+        <a:srgbClr val="BC5828"/>
+      </a:accent4>
+      <a:accent5>
+        <a:srgbClr val="800000"/>
+      </a:accent5>
+      <a:accent6>
+        <a:srgbClr val="333333"/>
+      </a:accent6>
+      <a:hlink>
+        <a:srgbClr val="ECE47C"/>
+      </a:hlink>
+      <a:folHlink>
+        <a:srgbClr val="FF5100"/>
+      </a:folHlink>
+    </a:clrScheme>
+    <a:fontScheme name="Office">
+      <a:majorFont>
+        <a:latin typeface="Arial"/>
+        <a:ea typeface=""/>
+        <a:cs typeface=""/>
+        <a:font script="Jpan" typeface="ＭＳ Ｐゴシック"/>
+        <a:font script="Hang" typeface="맑은 고딕"/>
+        <a:font script="Hans" typeface="宋体"/>
+        <a:font script="Hant" typeface="新細明體"/>
+        <a:font script="Arab" typeface="Times New Roman"/>
+        <a:font script="Hebr" typeface="Times New Roman"/>
+        <a:font script="Thai" typeface="Angsana New"/>
+        <a:font script="Ethi" typeface="Nyala"/>
+        <a:font script="Beng" typeface="Vrinda"/>
+        <a:font script="Gujr" typeface="Shruti"/>
+        <a:font script="Khmr" typeface="MoolBoran"/>
+        <a:font script="Knda" typeface="Tunga"/>
+        <a:font script="Guru" typeface="Raavi"/>
+        <a:font script="Cans" typeface="Euphemia"/>
+        <a:font script="Cher" typeface="Plantagenet Cherokee"/>
+        <a:font script="Yiii" typeface="Microsoft Yi Baiti"/>
+        <a:font script="Tibt" typeface="Microsoft Himalaya"/>
+        <a:font script="Thaa" typeface="MV Boli"/>
+        <a:font script="Deva" typeface="Mangal"/>
+        <a:font script="Telu" typeface="Gautami"/>
+        <a:font script="Taml" typeface="Latha"/>
+        <a:font script="Syrc" typeface="Estrangelo Edessa"/>
+        <a:font script="Orya" typeface="Kalinga"/>
+        <a:font script="Mlym" typeface="Kartika"/>
+        <a:font script="Laoo" typeface="DokChampa"/>
+        <a:font script="Sinh" typeface="Iskoola Pota"/>
+        <a:font script="Mong" typeface="Mongolian Baiti"/>
+        <a:font script="Viet" typeface="Times New Roman"/>
+        <a:font script="Uigh" typeface="Microsoft Uighur"/>
+      </a:majorFont>
+      <a:minorFont>
+        <a:latin typeface="Arial"/>
+        <a:ea typeface=""/>
+        <a:cs typeface=""/>
+        <a:font script="Jpan" typeface="ＭＳ Ｐゴシック"/>
+        <a:font script="Hang" typeface="맑은 고딕"/>
+        <a:font script="Hans" typeface="宋体"/>
+        <a:font script="Hant" typeface="新細明體"/>
+        <a:font script="Arab" typeface="Times New Roman"/>
+        <a:font script="Hebr" typeface="Times New Roman"/>
+        <a:font script="Thai" typeface="Angsana New"/>
+        <a:font script="Ethi" typeface="Nyala"/>
+        <a:font script="Beng" typeface="Vrinda"/>
+        <a:font script="Gujr" typeface="Shruti"/>
+        <a:font script="Khmr" typeface="MoolBoran"/>
+        <a:font script="Knda" typeface="Tunga"/>
+        <a:font script="Guru" typeface="Raavi"/>
+        <a:font script="Cans" typeface="Euphemia"/>
+        <a:font script="Cher" typeface="Plantagenet Cherokee"/>
+        <a:font script="Yiii" typeface="Microsoft Yi Baiti"/>
+        <a:font script="Tibt" typeface="Microsoft Himalaya"/>
+        <a:font script="Thaa" typeface="MV Boli"/>
+        <a:font script="Deva" typeface="Mangal"/>
+        <a:font script="Telu" typeface="Gautami"/>
+        <a:font script="Taml" typeface="Latha"/>
+        <a:font script="Syrc" typeface="Estrangelo Edessa"/>
+        <a:font script="Orya" typeface="Kalinga"/>
+        <a:font script="Mlym" typeface="Kartika"/>
+        <a:font script="Laoo" typeface="DokChampa"/>
+        <a:font script="Sinh" typeface="Iskoola Pota"/>
+        <a:font script="Mong" typeface="Mongolian Baiti"/>
+        <a:font script="Viet" typeface="Times New Roman"/>
+        <a:font script="Uigh" typeface="Microsoft Uighur"/>
+      </a:minorFont>
+    </a:fontScheme>
+    <a:fmtScheme name="Office">
+      <a:fillStyleLst>
+        <a:solidFill>
+          <a:schemeClr val="phClr"/>
+        </a:solidFill>
+        <a:gradFill rotWithShape="1">
+          <a:gsLst>
+            <a:gs pos="0">
+              <a:schemeClr val="phClr">
+                <a:tint val="50000"/>
+                <a:satMod val="300000"/>
+              </a:schemeClr>
+            </a:gs>
+            <a:gs pos="35000">
+              <a:schemeClr val="phClr">
+                <a:tint val="37000"/>
+                <a:satMod val="300000"/>
+              </a:schemeClr>
+            </a:gs>
+            <a:gs pos="100000">
+              <a:schemeClr val="phClr">
+                <a:tint val="15000"/>
+                <a:satMod val="350000"/>
+              </a:schemeClr>
+            </a:gs>
+          </a:gsLst>
+          <a:lin ang="16200000" scaled="1"/>
+        </a:gradFill>
+        <a:gradFill rotWithShape="1">
+          <a:gsLst>
+            <a:gs pos="0">
+              <a:schemeClr val="phClr">
+                <a:tint val="100000"/>
+                <a:shade val="100000"/>
+                <a:satMod val="130000"/>
+              </a:schemeClr>
+            </a:gs>
+            <a:gs pos="100000">
+              <a:schemeClr val="phClr">
+                <a:tint val="50000"/>
+                <a:shade val="100000"/>
+                <a:satMod val="350000"/>
+              </a:schemeClr>
+            </a:gs>
+          </a:gsLst>
+          <a:lin ang="16200000" scaled="0"/>
+        </a:gradFill>
+      </a:fillStyleLst>
+      <a:lnStyleLst>
+        <a:ln cap="flat" cmpd="sng" w="9525" algn="ctr">
+          <a:solidFill>
+            <a:schemeClr val="phClr">
+              <a:shade val="95000"/>
+              <a:satMod val="105000"/>
+            </a:schemeClr>
+          </a:solidFill>
+          <a:prstDash val="solid"/>
+        </a:ln>
+        <a:ln cap="flat" cmpd="sng" w="25400" algn="ctr">
+          <a:solidFill>
+            <a:schemeClr val="phClr"/>
+          </a:solidFill>
+          <a:prstDash val="solid"/>
+        </a:ln>
+        <a:ln cap="flat" cmpd="sng" w="38100" algn="ctr">
+          <a:solidFill>
+            <a:schemeClr val="phClr"/>
+          </a:solidFill>
+          <a:prstDash val="solid"/>
+        </a:ln>
+      </a:lnStyleLst>
+      <a:effectStyleLst>
+        <a:effectStyle>
+          <a:effectLst>
+            <a:outerShdw blurRad="40000" rotWithShape="0" dir="5400000" dist="20000">
+              <a:srgbClr val="000000">
+                <a:alpha val="38000"/>
+              </a:srgbClr>
+            </a:outerShdw>
+          </a:effectLst>
+        </a:effectStyle>
+        <a:effectStyle>
+          <a:effectLst>
+            <a:outerShdw blurRad="40000" rotWithShape="0" dir="5400000" dist="23000">
+              <a:srgbClr val="000000">
+                <a:alpha val="35000"/>
+              </a:srgbClr>
+            </a:outerShdw>
+          </a:effectLst>
+        </a:effectStyle>
+        <a:effectStyle>
+          <a:effectLst>
+            <a:outerShdw blurRad="40000" rotWithShape="0" dir="5400000" dist="23000">
+              <a:srgbClr val="000000">
+                <a:alpha val="35000"/>
+              </a:srgbClr>
+            </a:outerShdw>
+          </a:effectLst>
+          <a:scene3d>
+            <a:camera prst="orthographicFront">
+              <a:rot lat="0" lon="0" rev="0"/>
+            </a:camera>
+            <a:lightRig dir="t" rig="threePt">
+              <a:rot lat="0" lon="0" rev="1200000"/>
+            </a:lightRig>
+          </a:scene3d>
+          <a:sp3d>
+            <a:bevelT h="25400" w="63500"/>
+          </a:sp3d>
+        </a:effectStyle>
+      </a:effectStyleLst>
+      <a:bgFillStyleLst>
+        <a:solidFill>
+          <a:schemeClr val="phClr"/>
+        </a:solidFill>
+        <a:gradFill rotWithShape="1">
+          <a:gsLst>
+            <a:gs pos="0">
+              <a:schemeClr val="phClr">
+                <a:tint val="40000"/>
+                <a:satMod val="350000"/>
+              </a:schemeClr>
+            </a:gs>
+            <a:gs pos="40000">
+              <a:schemeClr val="phClr">
+                <a:tint val="45000"/>
+                <a:shade val="99000"/>
+                <a:satMod val="350000"/>
+              </a:schemeClr>
+            </a:gs>
+            <a:gs pos="100000">
+              <a:schemeClr val="phClr">
+                <a:shade val="20000"/>
+                <a:satMod val="255000"/>
+              </a:schemeClr>
+            </a:gs>
+          </a:gsLst>
+          <a:path path="circle">
+            <a:fillToRect b="180000" l="50000" r="50000" t="-80000"/>
+          </a:path>
+        </a:gradFill>
+        <a:gradFill rotWithShape="1">
+          <a:gsLst>
+            <a:gs pos="0">
+              <a:schemeClr val="phClr">
+                <a:tint val="80000"/>
+                <a:satMod val="300000"/>
+              </a:schemeClr>
+            </a:gs>
+            <a:gs pos="100000">
+              <a:schemeClr val="phClr">
+                <a:shade val="30000"/>
+                <a:satMod val="200000"/>
+              </a:schemeClr>
+            </a:gs>
+          </a:gsLst>
+          <a:path path="circle">
+            <a:fillToRect b="50000" l="50000" r="50000" t="50000"/>
+          </a:path>
+        </a:gradFill>
+      </a:bgFillStyleLst>
+    </a:fmtScheme>
+  </a:themeElements>
+</a:theme>
+</file>
+
+<file path=ppt/theme/theme3.xml><?xml version="1.0" encoding="utf-8"?>
+<a:theme xmlns:a="http://schemas.openxmlformats.org/drawingml/2006/main" xmlns:r="http://schemas.openxmlformats.org/officeDocument/2006/relationships" name="Custom Theme">
+  <a:themeElements>
+    <a:clrScheme name="Default">
+      <a:dk1>
+        <a:srgbClr val="000000"/>
+      </a:dk1>
+      <a:lt1>
+        <a:srgbClr val="FFFFFF"/>
+      </a:lt1>
+      <a:dk2>
+        <a:srgbClr val="158158"/>
+      </a:dk2>
+      <a:lt2>
+        <a:srgbClr val="F3F3F3"/>
+      </a:lt2>
+      <a:accent1>
+        <a:srgbClr val="058DC7"/>
+      </a:accent1>
+      <a:accent2>
+        <a:srgbClr val="50B432"/>
+      </a:accent2>
+      <a:accent3>
+        <a:srgbClr val="ED561B"/>
+      </a:accent3>
+      <a:accent4>
+        <a:srgbClr val="EDEF00"/>
+      </a:accent4>
+      <a:accent5>
+        <a:srgbClr val="24CBE5"/>
+      </a:accent5>
+      <a:accent6>
+        <a:srgbClr val="64E572"/>
+      </a:accent6>
+      <a:hlink>
+        <a:srgbClr val="2200CC"/>
+      </a:hlink>
+      <a:folHlink>
+        <a:srgbClr val="551A8B"/>
+      </a:folHlink>
+    </a:clrScheme>
+    <a:fontScheme name="Office">
+      <a:majorFont>
+        <a:latin typeface="Arial"/>
+        <a:ea typeface=""/>
+        <a:cs typeface=""/>
+        <a:font script="Jpan" typeface="ＭＳ Ｐゴシック"/>
+        <a:font script="Hang" typeface="맑은 고딕"/>
+        <a:font script="Hans" typeface="宋体"/>
+        <a:font script="Hant" typeface="新細明體"/>
+        <a:font script="Arab" typeface="Times New Roman"/>
+        <a:font script="Hebr" typeface="Times New Roman"/>
+        <a:font script="Thai" typeface="Angsana New"/>
+        <a:font script="Ethi" typeface="Nyala"/>
+        <a:font script="Beng" typeface="Vrinda"/>
+        <a:font script="Gujr" typeface="Shruti"/>
+        <a:font script="Khmr" typeface="MoolBoran"/>
+        <a:font script="Knda" typeface="Tunga"/>
+        <a:font script="Guru" typeface="Raavi"/>
+        <a:font script="Cans" typeface="Euphemia"/>
+        <a:font script="Cher" typeface="Plantagenet Cherokee"/>
+        <a:font script="Yiii" typeface="Microsoft Yi Baiti"/>
+        <a:font script="Tibt" typeface="Microsoft Himalaya"/>
+        <a:font script="Thaa" typeface="MV Boli"/>
+        <a:font script="Deva" typeface="Mangal"/>
+        <a:font script="Telu" typeface="Gautami"/>
+        <a:font script="Taml" typeface="Latha"/>
+        <a:font script="Syrc" typeface="Estrangelo Edessa"/>
+        <a:font script="Orya" typeface="Kalinga"/>
+        <a:font script="Mlym" typeface="Kartika"/>
+        <a:font script="Laoo" typeface="DokChampa"/>
+        <a:font script="Sinh" typeface="Iskoola Pota"/>
+        <a:font script="Mong" typeface="Mongolian Baiti"/>
+        <a:font script="Viet" typeface="Times New Roman"/>
+        <a:font script="Uigh" typeface="Microsoft Uighur"/>
+      </a:majorFont>
+      <a:minorFont>
+        <a:latin typeface="Arial"/>
+        <a:ea typeface=""/>
+        <a:cs typeface=""/>
+        <a:font script="Jpan" typeface="ＭＳ Ｐゴシック"/>
+        <a:font script="Hang" typeface="맑은 고딕"/>
+        <a:font script="Hans" typeface="宋体"/>
+        <a:font script="Hant" typeface="新細明體"/>
+        <a:font script="Arab" typeface="Times New Roman"/>
+        <a:font script="Hebr" typeface="Times New Roman"/>
+        <a:font script="Thai" typeface="Angsana New"/>
+        <a:font script="Ethi" typeface="Nyala"/>
+        <a:font script="Beng" typeface="Vrinda"/>
+        <a:font script="Gujr" typeface="Shruti"/>
+        <a:font script="Khmr" typeface="MoolBoran"/>
+        <a:font script="Knda" typeface="Tunga"/>
+        <a:font script="Guru" typeface="Raavi"/>
+        <a:font script="Cans" typeface="Euphemia"/>
+        <a:font script="Cher" typeface="Plantagenet Cherokee"/>
+        <a:font script="Yiii" typeface="Microsoft Yi Baiti"/>
+        <a:font script="Tibt" typeface="Microsoft Himalaya"/>
+        <a:font script="Thaa" typeface="MV Boli"/>
+        <a:font script="Deva" typeface="Mangal"/>
+        <a:font script="Telu" typeface="Gautami"/>
+        <a:font script="Taml" typeface="Latha"/>
+        <a:font script="Syrc" typeface="Estrangelo Edessa"/>
+        <a:font script="Orya" typeface="Kalinga"/>
+        <a:font script="Mlym" typeface="Kartika"/>
+        <a:font script="Laoo" typeface="DokChampa"/>
+        <a:font script="Sinh" typeface="Iskoola Pota"/>
+        <a:font script="Mong" typeface="Mongolian Baiti"/>
+        <a:font script="Viet" typeface="Times New Roman"/>
+        <a:font script="Uigh" typeface="Microsoft Uighur"/>
+      </a:minorFont>
+    </a:fontScheme>
+    <a:fmtScheme name="Office">
+      <a:fillStyleLst>
+        <a:solidFill>
+          <a:schemeClr val="phClr"/>
+        </a:solidFill>
+        <a:gradFill rotWithShape="1">
+          <a:gsLst>
+            <a:gs pos="0">
+              <a:schemeClr val="phClr">
+                <a:tint val="50000"/>
+                <a:satMod val="300000"/>
+              </a:schemeClr>
+            </a:gs>
+            <a:gs pos="35000">
+              <a:schemeClr val="phClr">
+                <a:tint val="37000"/>
+                <a:satMod val="300000"/>
+              </a:schemeClr>
+            </a:gs>
+            <a:gs pos="100000">
+              <a:schemeClr val="phClr">
+                <a:tint val="15000"/>
+                <a:satMod val="350000"/>
+              </a:schemeClr>
+            </a:gs>
+          </a:gsLst>
+          <a:lin ang="16200000" scaled="1"/>
+        </a:gradFill>
+        <a:gradFill rotWithShape="1">
+          <a:gsLst>
+            <a:gs pos="0">
+              <a:schemeClr val="phClr">
+                <a:tint val="100000"/>
+                <a:shade val="100000"/>
+                <a:satMod val="130000"/>
+              </a:schemeClr>
+            </a:gs>
+            <a:gs pos="100000">
+              <a:schemeClr val="phClr">
+                <a:tint val="50000"/>
+                <a:shade val="100000"/>
+                <a:satMod val="350000"/>
+              </a:schemeClr>
+            </a:gs>
+          </a:gsLst>
+          <a:lin ang="16200000" scaled="0"/>
+        </a:gradFill>
+      </a:fillStyleLst>
+      <a:lnStyleLst>
+        <a:ln cap="flat" cmpd="sng" w="9525" algn="ctr">
+          <a:solidFill>
+            <a:schemeClr val="phClr">
+              <a:shade val="95000"/>
+              <a:satMod val="105000"/>
+            </a:schemeClr>
+          </a:solidFill>
+          <a:prstDash val="solid"/>
+        </a:ln>
+        <a:ln cap="flat" cmpd="sng" w="25400" algn="ctr">
+          <a:solidFill>
+            <a:schemeClr val="phClr"/>
+          </a:solidFill>
+          <a:prstDash val="solid"/>
+        </a:ln>
+        <a:ln cap="flat" cmpd="sng" w="38100" algn="ctr">
+          <a:solidFill>
+            <a:schemeClr val="phClr"/>
+          </a:solidFill>
+          <a:prstDash val="solid"/>
+        </a:ln>
+      </a:lnStyleLst>
+      <a:effectStyleLst>
+        <a:effectStyle>
+          <a:effectLst>
+            <a:outerShdw blurRad="40000" rotWithShape="0" dir="5400000" dist="20000">
+              <a:srgbClr val="000000">
+                <a:alpha val="38000"/>
+              </a:srgbClr>
+            </a:outerShdw>
+          </a:effectLst>
+        </a:effectStyle>
+        <a:effectStyle>
+          <a:effectLst>
+            <a:outerShdw blurRad="40000" rotWithShape="0" dir="5400000" dist="23000">
+              <a:srgbClr val="000000">
+                <a:alpha val="35000"/>
+              </a:srgbClr>
+            </a:outerShdw>
+          </a:effectLst>
+        </a:effectStyle>
+        <a:effectStyle>
+          <a:effectLst>
+            <a:outerShdw blurRad="40000" rotWithShape="0" dir="5400000" dist="23000">
+              <a:srgbClr val="000000">
+                <a:alpha val="35000"/>
+              </a:srgbClr>
+            </a:outerShdw>
+          </a:effectLst>
+          <a:scene3d>
+            <a:camera prst="orthographicFront">
+              <a:rot lat="0" lon="0" rev="0"/>
+            </a:camera>
+            <a:lightRig dir="t" rig="threePt">
+              <a:rot lat="0" lon="0" rev="1200000"/>
+            </a:lightRig>
+          </a:scene3d>
+          <a:sp3d>
+            <a:bevelT h="25400" w="63500"/>
+          </a:sp3d>
+        </a:effectStyle>
+      </a:effectStyleLst>
+      <a:bgFillStyleLst>
+        <a:solidFill>
+          <a:schemeClr val="phClr"/>
+        </a:solidFill>
+        <a:gradFill rotWithShape="1">
+          <a:gsLst>
+            <a:gs pos="0">
+              <a:schemeClr val="phClr">
+                <a:tint val="40000"/>
+                <a:satMod val="350000"/>
+              </a:schemeClr>
+            </a:gs>
+            <a:gs pos="40000">
+              <a:schemeClr val="phClr">
+                <a:tint val="45000"/>
+                <a:shade val="99000"/>
+                <a:satMod val="350000"/>
+              </a:schemeClr>
+            </a:gs>
+            <a:gs pos="100000">
+              <a:schemeClr val="phClr">
+                <a:shade val="20000"/>
+                <a:satMod val="255000"/>
+              </a:schemeClr>
+            </a:gs>
+          </a:gsLst>
+          <a:path path="circle">
+            <a:fillToRect b="180000" l="50000" r="50000" t="-80000"/>
+          </a:path>
+        </a:gradFill>
+        <a:gradFill rotWithShape="1">
+          <a:gsLst>
+            <a:gs pos="0">
+              <a:schemeClr val="phClr">
+                <a:tint val="80000"/>
+                <a:satMod val="300000"/>
+              </a:schemeClr>
+            </a:gs>
+            <a:gs pos="100000">
+              <a:schemeClr val="phClr">
+                <a:shade val="30000"/>
+                <a:satMod val="200000"/>
+              </a:schemeClr>
+            </a:gs>
+          </a:gsLst>
+          <a:path path="circle">
+            <a:fillToRect b="50000" l="50000" r="50000" t="50000"/>
+          </a:path>
+        </a:gradFill>
+      </a:bgFillStyleLst>
+    </a:fmtScheme>
+  </a:themeElements>
+</a:theme>
 </file>
</xml_diff>